<commit_message>
Actually fixed poverty chart
</commit_message>
<xml_diff>
--- a/Group Project one - Final.pptx
+++ b/Group Project one - Final.pptx
@@ -212,7 +212,7 @@
           <a:p>
             <a:fld id="{EBEEC463-6649-4CA6-B1FF-E62EB0549193}" type="datetimeFigureOut">
               <a:rPr lang="en-US" smtClean="0"/>
-              <a:t>1/23/19</a:t>
+              <a:t>1/23/2019</a:t>
             </a:fld>
             <a:endParaRPr lang="en-US"/>
           </a:p>
@@ -820,7 +820,7 @@
           <a:p>
             <a:fld id="{087854FD-208A-4C44-851D-2D2BA798626A}" type="datetime1">
               <a:rPr lang="en-US" smtClean="0"/>
-              <a:t>1/23/19</a:t>
+              <a:t>1/23/2019</a:t>
             </a:fld>
             <a:endParaRPr lang="en-US" dirty="0"/>
           </a:p>
@@ -1086,7 +1086,7 @@
           <a:p>
             <a:fld id="{4398A69E-B9DF-4C22-AACE-ABC36BC18FDD}" type="datetime1">
               <a:rPr lang="en-US" smtClean="0"/>
-              <a:t>1/23/19</a:t>
+              <a:t>1/23/2019</a:t>
             </a:fld>
             <a:endParaRPr lang="en-US" dirty="0"/>
           </a:p>
@@ -1316,7 +1316,7 @@
           <a:p>
             <a:fld id="{D8E07B1D-CDB3-4096-A796-CA43FE89B647}" type="datetime1">
               <a:rPr lang="en-US" smtClean="0"/>
-              <a:t>1/23/19</a:t>
+              <a:t>1/23/2019</a:t>
             </a:fld>
             <a:endParaRPr lang="en-US" dirty="0"/>
           </a:p>
@@ -1625,7 +1625,7 @@
           <a:p>
             <a:fld id="{08C021AC-A13A-41E1-8AC6-9DA11D4E89AA}" type="datetime1">
               <a:rPr lang="en-US" smtClean="0"/>
-              <a:t>1/23/19</a:t>
+              <a:t>1/23/2019</a:t>
             </a:fld>
             <a:endParaRPr lang="en-US" dirty="0"/>
           </a:p>
@@ -2097,7 +2097,7 @@
           <a:p>
             <a:fld id="{4A2B6BC8-4096-4CB1-B016-08F5DAF7765A}" type="datetime1">
               <a:rPr lang="en-US" smtClean="0"/>
-              <a:t>1/23/19</a:t>
+              <a:t>1/23/2019</a:t>
             </a:fld>
             <a:endParaRPr lang="en-US" dirty="0"/>
           </a:p>
@@ -2643,7 +2643,7 @@
           <a:p>
             <a:fld id="{C08391A9-AAE5-45A0-A6B4-60846F445944}" type="datetime1">
               <a:rPr lang="en-US" smtClean="0"/>
-              <a:t>1/23/19</a:t>
+              <a:t>1/23/2019</a:t>
             </a:fld>
             <a:endParaRPr lang="en-US" dirty="0"/>
           </a:p>
@@ -3416,7 +3416,7 @@
           <a:p>
             <a:fld id="{CC477687-664A-45D4-AF3F-263825A62E5F}" type="datetime1">
               <a:rPr lang="en-US" smtClean="0"/>
-              <a:t>1/23/19</a:t>
+              <a:t>1/23/2019</a:t>
             </a:fld>
             <a:endParaRPr lang="en-US" dirty="0"/>
           </a:p>
@@ -3590,7 +3590,7 @@
           <a:p>
             <a:fld id="{3BB01675-064D-44FD-B536-85EECDD767E4}" type="datetime1">
               <a:rPr lang="en-US" smtClean="0"/>
-              <a:t>1/23/19</a:t>
+              <a:t>1/23/2019</a:t>
             </a:fld>
             <a:endParaRPr lang="en-US" dirty="0"/>
           </a:p>
@@ -3812,7 +3812,7 @@
           <a:p>
             <a:fld id="{44D3BC9E-B9EB-4F16-B11F-E8E614F3A490}" type="datetime1">
               <a:rPr lang="en-US" smtClean="0"/>
-              <a:t>1/23/19</a:t>
+              <a:t>1/23/2019</a:t>
             </a:fld>
             <a:endParaRPr lang="en-US" dirty="0"/>
           </a:p>
@@ -3991,7 +3991,7 @@
           <a:p>
             <a:fld id="{F8EDA6F4-FE8E-4C9E-9945-E8E875CE6068}" type="datetime1">
               <a:rPr lang="en-US" smtClean="0"/>
-              <a:t>1/23/19</a:t>
+              <a:t>1/23/2019</a:t>
             </a:fld>
             <a:endParaRPr lang="en-US" dirty="0"/>
           </a:p>
@@ -4279,7 +4279,7 @@
           <a:p>
             <a:fld id="{7DBBCC6B-3ED7-4010-B7C8-243423A442DF}" type="datetime1">
               <a:rPr lang="en-US" smtClean="0"/>
-              <a:t>1/23/19</a:t>
+              <a:t>1/23/2019</a:t>
             </a:fld>
             <a:endParaRPr lang="en-US" dirty="0"/>
           </a:p>
@@ -4520,7 +4520,7 @@
           <a:p>
             <a:fld id="{D1FE269D-2DC6-4A32-A537-F74EE5215011}" type="datetime1">
               <a:rPr lang="en-US" smtClean="0"/>
-              <a:t>1/23/19</a:t>
+              <a:t>1/23/2019</a:t>
             </a:fld>
             <a:endParaRPr lang="en-US" dirty="0"/>
           </a:p>
@@ -4898,7 +4898,7 @@
           <a:p>
             <a:fld id="{A74D7546-BCBA-46A7-8065-8E94F65EF83F}" type="datetime1">
               <a:rPr lang="en-US" smtClean="0"/>
-              <a:t>1/23/19</a:t>
+              <a:t>1/23/2019</a:t>
             </a:fld>
             <a:endParaRPr lang="en-US" dirty="0"/>
           </a:p>
@@ -5015,7 +5015,7 @@
           <a:p>
             <a:fld id="{5687AA2A-926F-4BE5-94D8-C5678B13AF79}" type="datetime1">
               <a:rPr lang="en-US" smtClean="0"/>
-              <a:t>1/23/19</a:t>
+              <a:t>1/23/2019</a:t>
             </a:fld>
             <a:endParaRPr lang="en-US" dirty="0"/>
           </a:p>
@@ -5109,7 +5109,7 @@
           <a:p>
             <a:fld id="{84834B64-7529-4855-B067-19556CD4451A}" type="datetime1">
               <a:rPr lang="en-US" smtClean="0"/>
-              <a:t>1/23/19</a:t>
+              <a:t>1/23/2019</a:t>
             </a:fld>
             <a:endParaRPr lang="en-US" dirty="0"/>
           </a:p>
@@ -5357,7 +5357,7 @@
           <a:p>
             <a:fld id="{4C737946-B8A3-4F29-A63D-ED059114489A}" type="datetime1">
               <a:rPr lang="en-US" smtClean="0"/>
-              <a:t>1/23/19</a:t>
+              <a:t>1/23/2019</a:t>
             </a:fld>
             <a:endParaRPr lang="en-US" dirty="0"/>
           </a:p>
@@ -5613,7 +5613,7 @@
           <a:p>
             <a:fld id="{6D7361A8-5E42-4E5E-872A-AF69B61596F9}" type="datetime1">
               <a:rPr lang="en-US" smtClean="0"/>
-              <a:t>1/23/19</a:t>
+              <a:t>1/23/2019</a:t>
             </a:fld>
             <a:endParaRPr lang="en-US" dirty="0"/>
           </a:p>
@@ -5855,7 +5855,7 @@
           <a:p>
             <a:fld id="{C8DA0BBE-6CDC-47A8-90AB-BA8366541172}" type="datetime1">
               <a:rPr lang="en-US" smtClean="0"/>
-              <a:t>1/23/19</a:t>
+              <a:t>1/23/2019</a:t>
             </a:fld>
             <a:endParaRPr lang="en-US" dirty="0"/>
           </a:p>
@@ -7965,21 +7965,52 @@
           </a:p>
         </p:txBody>
       </p:sp>
+      <p:sp>
+        <p:nvSpPr>
+          <p:cNvPr id="3" name="Footer Placeholder 2">
+            <a:extLst>
+              <a:ext uri="{FF2B5EF4-FFF2-40B4-BE49-F238E27FC236}">
+                <a16:creationId xmlns:a16="http://schemas.microsoft.com/office/drawing/2014/main" id="{CAAB63AF-9EDD-420C-A4D2-F9042302016C}"/>
+              </a:ext>
+            </a:extLst>
+          </p:cNvPr>
+          <p:cNvSpPr>
+            <a:spLocks noGrp="1"/>
+          </p:cNvSpPr>
+          <p:nvPr>
+            <p:ph type="ftr" sz="quarter" idx="11"/>
+          </p:nvPr>
+        </p:nvSpPr>
+        <p:spPr/>
+        <p:txBody>
+          <a:bodyPr/>
+          <a:lstStyle/>
+          <a:p>
+            <a:r>
+              <a:rPr lang="en-US" dirty="0"/>
+              <a:t>Poverty </a:t>
+            </a:r>
+            <a:r>
+              <a:rPr lang="en-US" dirty="0" err="1"/>
+              <a:t>Trends.ipynb</a:t>
+            </a:r>
+            <a:endParaRPr lang="en-US" dirty="0"/>
+          </a:p>
+        </p:txBody>
+      </p:sp>
       <p:pic>
         <p:nvPicPr>
-          <p:cNvPr id="5" name="Content Placeholder 4">
+          <p:cNvPr id="6" name="Picture 5">
             <a:extLst>
               <a:ext uri="{FF2B5EF4-FFF2-40B4-BE49-F238E27FC236}">
-                <a16:creationId xmlns:a16="http://schemas.microsoft.com/office/drawing/2014/main" id="{FE70BF56-62E4-4E5C-B0FE-4A779D7DC483}"/>
+                <a16:creationId xmlns:a16="http://schemas.microsoft.com/office/drawing/2014/main" id="{BFE918DA-0C54-4DD7-8BD8-457A15407D5A}"/>
               </a:ext>
             </a:extLst>
           </p:cNvPr>
           <p:cNvPicPr>
-            <a:picLocks noGrp="1" noChangeAspect="1"/>
+            <a:picLocks noChangeAspect="1"/>
           </p:cNvPicPr>
-          <p:nvPr>
-            <p:ph idx="1"/>
-          </p:nvPr>
+          <p:nvPr/>
         </p:nvPicPr>
         <p:blipFill>
           <a:blip r:embed="rId2"/>
@@ -7989,17 +8020,20 @@
         </p:blipFill>
         <p:spPr>
           <a:xfrm>
-            <a:off x="3728301" y="1681269"/>
-            <a:ext cx="4892511" cy="4892511"/>
-          </a:xfrm>
+            <a:off x="3713771" y="1956512"/>
+            <a:ext cx="4764458" cy="4764458"/>
+          </a:xfrm>
+          <a:prstGeom prst="rect">
+            <a:avLst/>
+          </a:prstGeom>
         </p:spPr>
       </p:pic>
       <p:sp>
         <p:nvSpPr>
-          <p:cNvPr id="3" name="Footer Placeholder 2">
+          <p:cNvPr id="8" name="Content Placeholder 7">
             <a:extLst>
               <a:ext uri="{FF2B5EF4-FFF2-40B4-BE49-F238E27FC236}">
-                <a16:creationId xmlns:a16="http://schemas.microsoft.com/office/drawing/2014/main" id="{CAAB63AF-9EDD-420C-A4D2-F9042302016C}"/>
+                <a16:creationId xmlns:a16="http://schemas.microsoft.com/office/drawing/2014/main" id="{CE14ABB3-431E-4471-BCF2-99DB01993941}"/>
               </a:ext>
             </a:extLst>
           </p:cNvPr>
@@ -8007,7 +8041,7 @@
             <a:spLocks noGrp="1"/>
           </p:cNvSpPr>
           <p:nvPr>
-            <p:ph type="ftr" sz="quarter" idx="11"/>
+            <p:ph idx="1"/>
           </p:nvPr>
         </p:nvSpPr>
         <p:spPr/>
@@ -8015,15 +8049,7 @@
           <a:bodyPr/>
           <a:lstStyle/>
           <a:p>
-            <a:r>
-              <a:rPr lang="en-US" dirty="0"/>
-              <a:t>Poverty </a:t>
-            </a:r>
-            <a:r>
-              <a:rPr lang="en-US" dirty="0" err="1"/>
-              <a:t>Trends.ipynb</a:t>
-            </a:r>
-            <a:endParaRPr lang="en-US" dirty="0"/>
+            <a:endParaRPr lang="en-US"/>
           </a:p>
         </p:txBody>
       </p:sp>

</xml_diff>